<commit_message>
Add final report + pres
</commit_message>
<xml_diff>
--- a/final-pres/final_workshop_pres.pptx
+++ b/final-pres/final_workshop_pres.pptx
@@ -12992,27 +12992,6 @@
                   <a:schemeClr val="dk2"/>
                 </a:solidFill>
               </a:rPr>
-              <a:t>Incomplete support in current Tomcat-Native</a:t>
-            </a:r>
-          </a:p>
-          <a:p>
-            <a:pPr indent="-228600" lvl="1" marL="914400" rtl="0">
-              <a:lnSpc>
-                <a:spcPct val="150000"/>
-              </a:lnSpc>
-              <a:spcBef>
-                <a:spcPts val="0"/>
-              </a:spcBef>
-              <a:buClr>
-                <a:schemeClr val="dk2"/>
-              </a:buClr>
-            </a:pPr>
-            <a:r>
-              <a:rPr lang="en">
-                <a:solidFill>
-                  <a:schemeClr val="dk2"/>
-                </a:solidFill>
-              </a:rPr>
               <a:t>Was not important for a prototype</a:t>
             </a:r>
             <a:br>
@@ -15300,44 +15279,44 @@
 </file>
 
 <file path=ppt/theme/theme1.xml><?xml version="1.0" encoding="utf-8"?>
-<a:theme xmlns:a="http://schemas.openxmlformats.org/drawingml/2006/main" xmlns:r="http://schemas.openxmlformats.org/officeDocument/2006/relationships" name="Custom Theme">
+<a:theme xmlns:a="http://schemas.openxmlformats.org/drawingml/2006/main" xmlns:r="http://schemas.openxmlformats.org/officeDocument/2006/relationships" name="material">
   <a:themeElements>
-    <a:clrScheme name="Default">
+    <a:clrScheme name="Material">
       <a:dk1>
-        <a:srgbClr val="000000"/>
+        <a:srgbClr val="4285F4"/>
       </a:dk1>
       <a:lt1>
         <a:srgbClr val="FFFFFF"/>
       </a:lt1>
       <a:dk2>
-        <a:srgbClr val="158158"/>
+        <a:srgbClr val="424242"/>
       </a:dk2>
       <a:lt2>
-        <a:srgbClr val="F3F3F3"/>
+        <a:srgbClr val="737373"/>
       </a:lt2>
       <a:accent1>
-        <a:srgbClr val="058DC7"/>
+        <a:srgbClr val="0277BD"/>
       </a:accent1>
       <a:accent2>
-        <a:srgbClr val="50B432"/>
+        <a:srgbClr val="0F9D58"/>
       </a:accent2>
       <a:accent3>
-        <a:srgbClr val="ED561B"/>
+        <a:srgbClr val="DB4437"/>
       </a:accent3>
       <a:accent4>
-        <a:srgbClr val="EDEF00"/>
+        <a:srgbClr val="FAFAFA"/>
       </a:accent4>
       <a:accent5>
-        <a:srgbClr val="24CBE5"/>
+        <a:srgbClr val="4FC3F7"/>
       </a:accent5>
       <a:accent6>
-        <a:srgbClr val="64E572"/>
+        <a:srgbClr val="F4B400"/>
       </a:accent6>
       <a:hlink>
-        <a:srgbClr val="2200CC"/>
+        <a:srgbClr val="4FC3F7"/>
       </a:hlink>
       <a:folHlink>
-        <a:srgbClr val="551A8B"/>
+        <a:srgbClr val="4FC3F7"/>
       </a:folHlink>
     </a:clrScheme>
     <a:fontScheme name="Office">
@@ -15579,44 +15558,44 @@
 </file>
 
 <file path=ppt/theme/theme2.xml><?xml version="1.0" encoding="utf-8"?>
-<a:theme xmlns:a="http://schemas.openxmlformats.org/drawingml/2006/main" xmlns:r="http://schemas.openxmlformats.org/officeDocument/2006/relationships" name="material">
+<a:theme xmlns:a="http://schemas.openxmlformats.org/drawingml/2006/main" xmlns:r="http://schemas.openxmlformats.org/officeDocument/2006/relationships" name="Custom Theme">
   <a:themeElements>
-    <a:clrScheme name="Material">
+    <a:clrScheme name="Default">
       <a:dk1>
-        <a:srgbClr val="4285F4"/>
+        <a:srgbClr val="000000"/>
       </a:dk1>
       <a:lt1>
         <a:srgbClr val="FFFFFF"/>
       </a:lt1>
       <a:dk2>
-        <a:srgbClr val="424242"/>
+        <a:srgbClr val="158158"/>
       </a:dk2>
       <a:lt2>
-        <a:srgbClr val="737373"/>
+        <a:srgbClr val="F3F3F3"/>
       </a:lt2>
       <a:accent1>
-        <a:srgbClr val="0277BD"/>
+        <a:srgbClr val="058DC7"/>
       </a:accent1>
       <a:accent2>
-        <a:srgbClr val="0F9D58"/>
+        <a:srgbClr val="50B432"/>
       </a:accent2>
       <a:accent3>
-        <a:srgbClr val="DB4437"/>
+        <a:srgbClr val="ED561B"/>
       </a:accent3>
       <a:accent4>
-        <a:srgbClr val="FAFAFA"/>
+        <a:srgbClr val="EDEF00"/>
       </a:accent4>
       <a:accent5>
-        <a:srgbClr val="4FC3F7"/>
+        <a:srgbClr val="24CBE5"/>
       </a:accent5>
       <a:accent6>
-        <a:srgbClr val="F4B400"/>
+        <a:srgbClr val="64E572"/>
       </a:accent6>
       <a:hlink>
-        <a:srgbClr val="4FC3F7"/>
+        <a:srgbClr val="2200CC"/>
       </a:hlink>
       <a:folHlink>
-        <a:srgbClr val="4FC3F7"/>
+        <a:srgbClr val="551A8B"/>
       </a:folHlink>
     </a:clrScheme>
     <a:fontScheme name="Office">

</xml_diff>